<commit_message>
Updated presentation, added UML Diagram
</commit_message>
<xml_diff>
--- a/design_patterns_for_lunch_memento - 27-10-2020.pptx
+++ b/design_patterns_for_lunch_memento - 27-10-2020.pptx
@@ -8,15 +8,16 @@
     <p:sldMasterId id="2147483866" r:id="rId4"/>
   </p:sldMasterIdLst>
   <p:notesMasterIdLst>
-    <p:notesMasterId r:id="rId11"/>
+    <p:notesMasterId r:id="rId12"/>
   </p:notesMasterIdLst>
   <p:sldIdLst>
     <p:sldId id="257" r:id="rId5"/>
     <p:sldId id="351" r:id="rId6"/>
     <p:sldId id="353" r:id="rId7"/>
-    <p:sldId id="358" r:id="rId8"/>
-    <p:sldId id="357" r:id="rId9"/>
-    <p:sldId id="258" r:id="rId10"/>
+    <p:sldId id="359" r:id="rId8"/>
+    <p:sldId id="358" r:id="rId9"/>
+    <p:sldId id="357" r:id="rId10"/>
+    <p:sldId id="258" r:id="rId11"/>
   </p:sldIdLst>
   <p:sldSz cx="12192000" cy="6858000"/>
   <p:notesSz cx="6858000" cy="9144000"/>
@@ -123,6 +124,18 @@
 </p:presentation>
 </file>
 
+<file path=ppt/commentAuthors.xml><?xml version="1.0" encoding="utf-8"?>
+<p:cmAuthorLst xmlns:a="http://schemas.openxmlformats.org/drawingml/2006/main" xmlns:r="http://schemas.openxmlformats.org/officeDocument/2006/relationships" xmlns:p="http://schemas.openxmlformats.org/presentationml/2006/main">
+  <p:cmAuthor id="1" name="Mudde, Lars" initials="ML" lastIdx="1" clrIdx="0">
+    <p:extLst>
+      <p:ext uri="{19B8F6BF-5375-455C-9EA6-DF929625EA0E}">
+        <p15:presenceInfo xmlns:p15="http://schemas.microsoft.com/office/powerpoint/2012/main" userId="S::lars.mudde@capgemini.com::df7dca88-2db8-4061-b7cb-4834ca21fba8" providerId="AD"/>
+      </p:ext>
+    </p:extLst>
+  </p:cmAuthor>
+</p:cmAuthorLst>
+</file>
+
 <file path=ppt/notesMasters/notesMaster1.xml><?xml version="1.0" encoding="utf-8"?>
 <p:notesMaster xmlns:a="http://schemas.openxmlformats.org/drawingml/2006/main" xmlns:r="http://schemas.openxmlformats.org/officeDocument/2006/relationships" xmlns:p="http://schemas.openxmlformats.org/presentationml/2006/main">
   <p:cSld>
@@ -205,7 +218,7 @@
           <a:p>
             <a:fld id="{94E27263-93C0-4A66-AEE9-6393693103CC}" type="datetimeFigureOut">
               <a:rPr lang="nl-NL" smtClean="0"/>
-              <a:t>23-10-2020</a:t>
+              <a:t>27-10-2020</a:t>
             </a:fld>
             <a:endParaRPr lang="nl-NL"/>
           </a:p>
@@ -792,7 +805,7 @@
           <a:p>
             <a:fld id="{FE95A6A2-1E30-439E-B803-AFE55DB3F8FB}" type="slidenum">
               <a:rPr lang="nl-NL" smtClean="0"/>
-              <a:t>4</a:t>
+              <a:t>5</a:t>
             </a:fld>
             <a:endParaRPr lang="nl-NL"/>
           </a:p>
@@ -876,7 +889,7 @@
           <a:p>
             <a:fld id="{FE95A6A2-1E30-439E-B803-AFE55DB3F8FB}" type="slidenum">
               <a:rPr lang="nl-NL" smtClean="0"/>
-              <a:t>5</a:t>
+              <a:t>6</a:t>
             </a:fld>
             <a:endParaRPr lang="nl-NL"/>
           </a:p>
@@ -932,7 +945,7 @@
           <a:graphicData uri="http://schemas.openxmlformats.org/presentationml/2006/ole">
             <mc:AlternateContent xmlns:mc="http://schemas.openxmlformats.org/markup-compatibility/2006">
               <mc:Choice xmlns:v="urn:schemas-microsoft-com:vml" Requires="v">
-                <p:oleObj spid="_x0000_s3126" name="think-cell Slide" r:id="rId4" imgW="270" imgH="270" progId="TCLayout.ActiveDocument.1">
+                <p:oleObj spid="_x0000_s3131" name="think-cell Slide" r:id="rId4" imgW="270" imgH="270" progId="TCLayout.ActiveDocument.1">
                   <p:embed/>
                 </p:oleObj>
               </mc:Choice>
@@ -3739,7 +3752,7 @@
           </a:ln>
           <a:extLst>
             <a:ext uri="{91240B29-F687-4f45-9708-019B960494DF}">
-              <a14:hiddenLine xmlns="" xmlns:a14="http://schemas.microsoft.com/office/drawing/2010/main" w="9525">
+              <a14:hiddenLine xmlns:a14="http://schemas.microsoft.com/office/drawing/2010/main" xmlns="" w="9525">
                 <a:solidFill>
                   <a:srgbClr val="000000"/>
                 </a:solidFill>
@@ -3911,7 +3924,7 @@
             </a:ln>
             <a:extLst>
               <a:ext uri="{91240B29-F687-4f45-9708-019B960494DF}">
-                <a14:hiddenLine xmlns="" xmlns:a14="http://schemas.microsoft.com/office/drawing/2010/main" w="9525">
+                <a14:hiddenLine xmlns:a14="http://schemas.microsoft.com/office/drawing/2010/main" xmlns="" w="9525">
                   <a:solidFill>
                     <a:srgbClr val="000000"/>
                   </a:solidFill>
@@ -4092,7 +4105,7 @@
             </a:ln>
             <a:extLst>
               <a:ext uri="{91240B29-F687-4f45-9708-019B960494DF}">
-                <a14:hiddenLine xmlns="" xmlns:a14="http://schemas.microsoft.com/office/drawing/2010/main" w="9525">
+                <a14:hiddenLine xmlns:a14="http://schemas.microsoft.com/office/drawing/2010/main" xmlns="" w="9525">
                   <a:solidFill>
                     <a:srgbClr val="000000"/>
                   </a:solidFill>
@@ -4900,7 +4913,7 @@
             </a:ln>
             <a:extLst>
               <a:ext uri="{91240B29-F687-4f45-9708-019B960494DF}">
-                <a14:hiddenLine xmlns:a14="http://schemas.microsoft.com/office/drawing/2010/main" xmlns="" w="9525">
+                <a14:hiddenLine xmlns="" xmlns:a14="http://schemas.microsoft.com/office/drawing/2010/main" w="9525">
                   <a:solidFill>
                     <a:srgbClr val="000000"/>
                   </a:solidFill>
@@ -5281,7 +5294,7 @@
             </a:ln>
             <a:extLst>
               <a:ext uri="{91240B29-F687-4f45-9708-019B960494DF}">
-                <a14:hiddenLine xmlns:a14="http://schemas.microsoft.com/office/drawing/2010/main" xmlns="" w="9525">
+                <a14:hiddenLine xmlns="" xmlns:a14="http://schemas.microsoft.com/office/drawing/2010/main" w="9525">
                   <a:solidFill>
                     <a:srgbClr val="000000"/>
                   </a:solidFill>
@@ -5594,7 +5607,7 @@
             </a:ln>
             <a:extLst>
               <a:ext uri="{91240B29-F687-4f45-9708-019B960494DF}">
-                <a14:hiddenLine xmlns:a14="http://schemas.microsoft.com/office/drawing/2010/main" xmlns="" w="9525">
+                <a14:hiddenLine xmlns="" xmlns:a14="http://schemas.microsoft.com/office/drawing/2010/main" w="9525">
                   <a:solidFill>
                     <a:srgbClr val="000000"/>
                   </a:solidFill>
@@ -5907,7 +5920,7 @@
             </a:ln>
             <a:extLst>
               <a:ext uri="{91240B29-F687-4f45-9708-019B960494DF}">
-                <a14:hiddenLine xmlns:a14="http://schemas.microsoft.com/office/drawing/2010/main" xmlns="" w="9525">
+                <a14:hiddenLine xmlns="" xmlns:a14="http://schemas.microsoft.com/office/drawing/2010/main" w="9525">
                   <a:solidFill>
                     <a:srgbClr val="000000"/>
                   </a:solidFill>
@@ -6089,7 +6102,7 @@
             </a:ln>
             <a:extLst>
               <a:ext uri="{91240B29-F687-4f45-9708-019B960494DF}">
-                <a14:hiddenLine xmlns:a14="http://schemas.microsoft.com/office/drawing/2010/main" xmlns="" w="9525">
+                <a14:hiddenLine xmlns="" xmlns:a14="http://schemas.microsoft.com/office/drawing/2010/main" w="9525">
                   <a:solidFill>
                     <a:srgbClr val="000000"/>
                   </a:solidFill>
@@ -6470,7 +6483,7 @@
             </a:ln>
             <a:extLst>
               <a:ext uri="{91240B29-F687-4f45-9708-019B960494DF}">
-                <a14:hiddenLine xmlns:a14="http://schemas.microsoft.com/office/drawing/2010/main" xmlns="" w="9525">
+                <a14:hiddenLine xmlns="" xmlns:a14="http://schemas.microsoft.com/office/drawing/2010/main" w="9525">
                   <a:solidFill>
                     <a:srgbClr val="000000"/>
                   </a:solidFill>
@@ -6842,7 +6855,7 @@
             </a:ln>
             <a:extLst>
               <a:ext uri="{91240B29-F687-4f45-9708-019B960494DF}">
-                <a14:hiddenLine xmlns:a14="http://schemas.microsoft.com/office/drawing/2010/main" xmlns="" w="9525">
+                <a14:hiddenLine xmlns="" xmlns:a14="http://schemas.microsoft.com/office/drawing/2010/main" w="9525">
                   <a:solidFill>
                     <a:srgbClr val="000000"/>
                   </a:solidFill>
@@ -7285,7 +7298,7 @@
             </a:ln>
             <a:extLst>
               <a:ext uri="{91240B29-F687-4f45-9708-019B960494DF}">
-                <a14:hiddenLine xmlns:a14="http://schemas.microsoft.com/office/drawing/2010/main" xmlns="" w="9525">
+                <a14:hiddenLine xmlns="" xmlns:a14="http://schemas.microsoft.com/office/drawing/2010/main" w="9525">
                   <a:solidFill>
                     <a:srgbClr val="000000"/>
                   </a:solidFill>
@@ -7527,7 +7540,7 @@
             </a:ln>
             <a:extLst>
               <a:ext uri="{91240B29-F687-4f45-9708-019B960494DF}">
-                <a14:hiddenLine xmlns:a14="http://schemas.microsoft.com/office/drawing/2010/main" xmlns="" w="9525">
+                <a14:hiddenLine xmlns="" xmlns:a14="http://schemas.microsoft.com/office/drawing/2010/main" w="9525">
                   <a:solidFill>
                     <a:srgbClr val="000000"/>
                   </a:solidFill>
@@ -7769,7 +7782,7 @@
             </a:ln>
             <a:extLst>
               <a:ext uri="{91240B29-F687-4f45-9708-019B960494DF}">
-                <a14:hiddenLine xmlns:a14="http://schemas.microsoft.com/office/drawing/2010/main" xmlns="" w="9525">
+                <a14:hiddenLine xmlns="" xmlns:a14="http://schemas.microsoft.com/office/drawing/2010/main" w="9525">
                   <a:solidFill>
                     <a:srgbClr val="000000"/>
                   </a:solidFill>
@@ -8150,7 +8163,7 @@
             </a:ln>
             <a:extLst>
               <a:ext uri="{91240B29-F687-4f45-9708-019B960494DF}">
-                <a14:hiddenLine xmlns:a14="http://schemas.microsoft.com/office/drawing/2010/main" xmlns="" w="9525">
+                <a14:hiddenLine xmlns="" xmlns:a14="http://schemas.microsoft.com/office/drawing/2010/main" w="9525">
                   <a:solidFill>
                     <a:srgbClr val="000000"/>
                   </a:solidFill>
@@ -8352,7 +8365,7 @@
             </a:ln>
             <a:extLst>
               <a:ext uri="{91240B29-F687-4f45-9708-019B960494DF}">
-                <a14:hiddenLine xmlns:a14="http://schemas.microsoft.com/office/drawing/2010/main" xmlns="" w="9525">
+                <a14:hiddenLine xmlns="" xmlns:a14="http://schemas.microsoft.com/office/drawing/2010/main" w="9525">
                   <a:solidFill>
                     <a:srgbClr val="000000"/>
                   </a:solidFill>
@@ -8514,7 +8527,7 @@
             </a:ln>
             <a:extLst>
               <a:ext uri="{91240B29-F687-4f45-9708-019B960494DF}">
-                <a14:hiddenLine xmlns:a14="http://schemas.microsoft.com/office/drawing/2010/main" xmlns="" w="9525">
+                <a14:hiddenLine xmlns="" xmlns:a14="http://schemas.microsoft.com/office/drawing/2010/main" w="9525">
                   <a:solidFill>
                     <a:srgbClr val="000000"/>
                   </a:solidFill>
@@ -8716,7 +8729,7 @@
             </a:ln>
             <a:extLst>
               <a:ext uri="{91240B29-F687-4f45-9708-019B960494DF}">
-                <a14:hiddenLine xmlns:a14="http://schemas.microsoft.com/office/drawing/2010/main" xmlns="" w="9525">
+                <a14:hiddenLine xmlns="" xmlns:a14="http://schemas.microsoft.com/office/drawing/2010/main" w="9525">
                   <a:solidFill>
                     <a:srgbClr val="000000"/>
                   </a:solidFill>
@@ -9097,7 +9110,7 @@
             </a:ln>
             <a:extLst>
               <a:ext uri="{91240B29-F687-4f45-9708-019B960494DF}">
-                <a14:hiddenLine xmlns:a14="http://schemas.microsoft.com/office/drawing/2010/main" xmlns="" w="9525">
+                <a14:hiddenLine xmlns="" xmlns:a14="http://schemas.microsoft.com/office/drawing/2010/main" w="9525">
                   <a:solidFill>
                     <a:srgbClr val="000000"/>
                   </a:solidFill>
@@ -9481,7 +9494,7 @@
             </a:ln>
             <a:extLst>
               <a:ext uri="{91240B29-F687-4f45-9708-019B960494DF}">
-                <a14:hiddenLine xmlns:a14="http://schemas.microsoft.com/office/drawing/2010/main" xmlns="" w="9525">
+                <a14:hiddenLine xmlns="" xmlns:a14="http://schemas.microsoft.com/office/drawing/2010/main" w="9525">
                   <a:solidFill>
                     <a:srgbClr val="000000"/>
                   </a:solidFill>
@@ -9703,7 +9716,7 @@
             </a:ln>
             <a:extLst>
               <a:ext uri="{91240B29-F687-4f45-9708-019B960494DF}">
-                <a14:hiddenLine xmlns:a14="http://schemas.microsoft.com/office/drawing/2010/main" xmlns="" w="9525">
+                <a14:hiddenLine xmlns="" xmlns:a14="http://schemas.microsoft.com/office/drawing/2010/main" w="9525">
                   <a:solidFill>
                     <a:srgbClr val="000000"/>
                   </a:solidFill>
@@ -9885,7 +9898,7 @@
             </a:ln>
             <a:extLst>
               <a:ext uri="{91240B29-F687-4f45-9708-019B960494DF}">
-                <a14:hiddenLine xmlns:a14="http://schemas.microsoft.com/office/drawing/2010/main" xmlns="" w="9525">
+                <a14:hiddenLine xmlns="" xmlns:a14="http://schemas.microsoft.com/office/drawing/2010/main" w="9525">
                   <a:solidFill>
                     <a:srgbClr val="000000"/>
                   </a:solidFill>
@@ -10127,7 +10140,7 @@
             </a:ln>
             <a:extLst>
               <a:ext uri="{91240B29-F687-4f45-9708-019B960494DF}">
-                <a14:hiddenLine xmlns:a14="http://schemas.microsoft.com/office/drawing/2010/main" xmlns="" w="9525">
+                <a14:hiddenLine xmlns="" xmlns:a14="http://schemas.microsoft.com/office/drawing/2010/main" w="9525">
                   <a:solidFill>
                     <a:srgbClr val="000000"/>
                   </a:solidFill>
@@ -10511,7 +10524,7 @@
             </a:ln>
             <a:extLst>
               <a:ext uri="{91240B29-F687-4f45-9708-019B960494DF}">
-                <a14:hiddenLine xmlns:a14="http://schemas.microsoft.com/office/drawing/2010/main" xmlns="" w="9525">
+                <a14:hiddenLine xmlns="" xmlns:a14="http://schemas.microsoft.com/office/drawing/2010/main" w="9525">
                   <a:solidFill>
                     <a:srgbClr val="000000"/>
                   </a:solidFill>
@@ -10785,7 +10798,7 @@
             </a:ln>
             <a:extLst>
               <a:ext uri="{91240B29-F687-4f45-9708-019B960494DF}">
-                <a14:hiddenLine xmlns:a14="http://schemas.microsoft.com/office/drawing/2010/main" xmlns="" w="9525">
+                <a14:hiddenLine xmlns="" xmlns:a14="http://schemas.microsoft.com/office/drawing/2010/main" w="9525">
                   <a:solidFill>
                     <a:srgbClr val="000000"/>
                   </a:solidFill>
@@ -11098,7 +11111,7 @@
             </a:ln>
             <a:extLst>
               <a:ext uri="{91240B29-F687-4f45-9708-019B960494DF}">
-                <a14:hiddenLine xmlns:a14="http://schemas.microsoft.com/office/drawing/2010/main" xmlns="" w="9525">
+                <a14:hiddenLine xmlns="" xmlns:a14="http://schemas.microsoft.com/office/drawing/2010/main" w="9525">
                   <a:solidFill>
                     <a:srgbClr val="000000"/>
                   </a:solidFill>
@@ -11320,7 +11333,7 @@
             </a:ln>
             <a:extLst>
               <a:ext uri="{91240B29-F687-4f45-9708-019B960494DF}">
-                <a14:hiddenLine xmlns:a14="http://schemas.microsoft.com/office/drawing/2010/main" xmlns="" w="9525">
+                <a14:hiddenLine xmlns="" xmlns:a14="http://schemas.microsoft.com/office/drawing/2010/main" w="9525">
                   <a:solidFill>
                     <a:srgbClr val="000000"/>
                   </a:solidFill>
@@ -11562,7 +11575,7 @@
             </a:ln>
             <a:extLst>
               <a:ext uri="{91240B29-F687-4f45-9708-019B960494DF}">
-                <a14:hiddenLine xmlns:a14="http://schemas.microsoft.com/office/drawing/2010/main" xmlns="" w="9525">
+                <a14:hiddenLine xmlns="" xmlns:a14="http://schemas.microsoft.com/office/drawing/2010/main" w="9525">
                   <a:solidFill>
                     <a:srgbClr val="000000"/>
                   </a:solidFill>
@@ -11804,7 +11817,7 @@
             </a:ln>
             <a:extLst>
               <a:ext uri="{91240B29-F687-4f45-9708-019B960494DF}">
-                <a14:hiddenLine xmlns:a14="http://schemas.microsoft.com/office/drawing/2010/main" xmlns="" w="9525">
+                <a14:hiddenLine xmlns="" xmlns:a14="http://schemas.microsoft.com/office/drawing/2010/main" w="9525">
                   <a:solidFill>
                     <a:srgbClr val="000000"/>
                   </a:solidFill>
@@ -11948,7 +11961,7 @@
             </a:ln>
             <a:extLst>
               <a:ext uri="{91240B29-F687-4f45-9708-019B960494DF}">
-                <a14:hiddenLine xmlns:a14="http://schemas.microsoft.com/office/drawing/2010/main" xmlns="" w="9525">
+                <a14:hiddenLine xmlns="" xmlns:a14="http://schemas.microsoft.com/office/drawing/2010/main" w="9525">
                   <a:solidFill>
                     <a:srgbClr val="000000"/>
                   </a:solidFill>
@@ -12675,7 +12688,7 @@
           <a:graphicData uri="http://schemas.openxmlformats.org/presentationml/2006/ole">
             <mc:AlternateContent xmlns:mc="http://schemas.openxmlformats.org/markup-compatibility/2006">
               <mc:Choice xmlns:v="urn:schemas-microsoft-com:vml" Requires="v">
-                <p:oleObj spid="_x0000_s16437" name="think-cell Slide" r:id="rId4" imgW="270" imgH="270" progId="TCLayout.ActiveDocument.1">
+                <p:oleObj spid="_x0000_s16442" name="think-cell Slide" r:id="rId4" imgW="270" imgH="270" progId="TCLayout.ActiveDocument.1">
                   <p:embed/>
                 </p:oleObj>
               </mc:Choice>
@@ -13784,7 +13797,7 @@
           <a:graphicData uri="http://schemas.openxmlformats.org/presentationml/2006/ole">
             <mc:AlternateContent xmlns:mc="http://schemas.openxmlformats.org/markup-compatibility/2006">
               <mc:Choice xmlns:v="urn:schemas-microsoft-com:vml" Requires="v">
-                <p:oleObj spid="_x0000_s18485" name="think-cell Slide" r:id="rId4" imgW="270" imgH="270" progId="TCLayout.ActiveDocument.1">
+                <p:oleObj spid="_x0000_s18490" name="think-cell Slide" r:id="rId4" imgW="270" imgH="270" progId="TCLayout.ActiveDocument.1">
                   <p:embed/>
                 </p:oleObj>
               </mc:Choice>
@@ -14732,7 +14745,7 @@
           <a:graphicData uri="http://schemas.openxmlformats.org/presentationml/2006/ole">
             <mc:AlternateContent xmlns:mc="http://schemas.openxmlformats.org/markup-compatibility/2006">
               <mc:Choice xmlns:v="urn:schemas-microsoft-com:vml" Requires="v">
-                <p:oleObj spid="_x0000_s2102" name="think-cell Slide" r:id="rId5" imgW="270" imgH="270" progId="TCLayout.ActiveDocument.1">
+                <p:oleObj spid="_x0000_s2107" name="think-cell Slide" r:id="rId5" imgW="270" imgH="270" progId="TCLayout.ActiveDocument.1">
                   <p:embed/>
                 </p:oleObj>
               </mc:Choice>
@@ -15462,7 +15475,7 @@
           <a:graphicData uri="http://schemas.openxmlformats.org/presentationml/2006/ole">
             <mc:AlternateContent xmlns:mc="http://schemas.openxmlformats.org/markup-compatibility/2006">
               <mc:Choice xmlns:v="urn:schemas-microsoft-com:vml" Requires="v">
-                <p:oleObj spid="_x0000_s4150" name="think-cell Slide" r:id="rId6" imgW="270" imgH="270" progId="TCLayout.ActiveDocument.1">
+                <p:oleObj spid="_x0000_s4155" name="think-cell Slide" r:id="rId6" imgW="270" imgH="270" progId="TCLayout.ActiveDocument.1">
                   <p:embed/>
                 </p:oleObj>
               </mc:Choice>
@@ -15892,7 +15905,7 @@
           <a:graphicData uri="http://schemas.openxmlformats.org/presentationml/2006/ole">
             <mc:AlternateContent xmlns:mc="http://schemas.openxmlformats.org/markup-compatibility/2006">
               <mc:Choice xmlns:v="urn:schemas-microsoft-com:vml" Requires="v">
-                <p:oleObj spid="_x0000_s15414" name="think-cell Slide" r:id="rId6" imgW="270" imgH="270" progId="TCLayout.ActiveDocument.1">
+                <p:oleObj spid="_x0000_s15419" name="think-cell Slide" r:id="rId6" imgW="270" imgH="270" progId="TCLayout.ActiveDocument.1">
                   <p:embed/>
                 </p:oleObj>
               </mc:Choice>
@@ -18324,7 +18337,7 @@
           <a:graphicData uri="http://schemas.openxmlformats.org/presentationml/2006/ole">
             <mc:AlternateContent xmlns:mc="http://schemas.openxmlformats.org/markup-compatibility/2006">
               <mc:Choice xmlns:v="urn:schemas-microsoft-com:vml" Requires="v">
-                <p:oleObj spid="_x0000_s1078" name="think-cell Slide" r:id="rId5" imgW="270" imgH="270" progId="TCLayout.ActiveDocument.1">
+                <p:oleObj spid="_x0000_s1083" name="think-cell Slide" r:id="rId5" imgW="270" imgH="270" progId="TCLayout.ActiveDocument.1">
                   <p:embed/>
                 </p:oleObj>
               </mc:Choice>
@@ -19698,7 +19711,7 @@
           <a:graphicData uri="http://schemas.openxmlformats.org/presentationml/2006/ole">
             <mc:AlternateContent xmlns:mc="http://schemas.openxmlformats.org/markup-compatibility/2006">
               <mc:Choice xmlns:v="urn:schemas-microsoft-com:vml" Requires="v">
-                <p:oleObj spid="_x0000_s17464" name="think-cell Slide" r:id="rId5" imgW="270" imgH="270" progId="TCLayout.ActiveDocument.1">
+                <p:oleObj spid="_x0000_s17469" name="think-cell Slide" r:id="rId5" imgW="270" imgH="270" progId="TCLayout.ActiveDocument.1">
                   <p:embed/>
                 </p:oleObj>
               </mc:Choice>
@@ -23260,6 +23273,326 @@
       </p:grpSpPr>
       <p:sp>
         <p:nvSpPr>
+          <p:cNvPr id="10" name="Text Placeholder 10">
+            <a:extLst>
+              <a:ext uri="{FF2B5EF4-FFF2-40B4-BE49-F238E27FC236}">
+                <a16:creationId xmlns:a16="http://schemas.microsoft.com/office/drawing/2014/main" id="{04E7FF15-3899-3C48-A48A-5A7BC9DFE147}"/>
+              </a:ext>
+            </a:extLst>
+          </p:cNvPr>
+          <p:cNvSpPr txBox="1">
+            <a:spLocks/>
+          </p:cNvSpPr>
+          <p:nvPr/>
+        </p:nvSpPr>
+        <p:spPr>
+          <a:xfrm>
+            <a:off x="476192" y="782158"/>
+            <a:ext cx="11152072" cy="2249277"/>
+          </a:xfrm>
+          <a:prstGeom prst="rect">
+            <a:avLst/>
+          </a:prstGeom>
+        </p:spPr>
+        <p:txBody>
+          <a:bodyPr/>
+          <a:lstStyle/>
+          <a:p>
+            <a:pPr marL="457200" lvl="0" indent="-457200">
+              <a:lnSpc>
+                <a:spcPct val="90000"/>
+              </a:lnSpc>
+              <a:spcBef>
+                <a:spcPts val="1000"/>
+              </a:spcBef>
+              <a:buClr>
+                <a:srgbClr val="0070AD"/>
+              </a:buClr>
+              <a:buFont typeface="Arial" panose="020B0604020202020204" pitchFamily="34" charset="0"/>
+              <a:buChar char="•"/>
+              <a:defRPr/>
+            </a:pPr>
+            <a:r>
+              <a:rPr lang="en-US" dirty="0"/>
+              <a:t>A way to store previous states of an object easily.</a:t>
+            </a:r>
+            <a:br>
+              <a:rPr lang="en-US" dirty="0"/>
+            </a:br>
+            <a:endParaRPr lang="en-US" dirty="0"/>
+          </a:p>
+          <a:p>
+            <a:pPr marL="457200" lvl="0" indent="-457200">
+              <a:lnSpc>
+                <a:spcPct val="90000"/>
+              </a:lnSpc>
+              <a:spcBef>
+                <a:spcPts val="1000"/>
+              </a:spcBef>
+              <a:buClr>
+                <a:srgbClr val="0070AD"/>
+              </a:buClr>
+              <a:buFont typeface="Arial" panose="020B0604020202020204" pitchFamily="34" charset="0"/>
+              <a:buChar char="•"/>
+              <a:defRPr/>
+            </a:pPr>
+            <a:r>
+              <a:rPr lang="en-US" dirty="0"/>
+              <a:t>Memento (object): The basic object that is stored in different states.</a:t>
+            </a:r>
+            <a:br>
+              <a:rPr lang="en-US" dirty="0"/>
+            </a:br>
+            <a:endParaRPr lang="en-US" dirty="0"/>
+          </a:p>
+          <a:p>
+            <a:pPr marL="457200" lvl="0" indent="-457200">
+              <a:lnSpc>
+                <a:spcPct val="90000"/>
+              </a:lnSpc>
+              <a:spcBef>
+                <a:spcPts val="1000"/>
+              </a:spcBef>
+              <a:buClr>
+                <a:srgbClr val="0070AD"/>
+              </a:buClr>
+              <a:buFont typeface="Arial" panose="020B0604020202020204" pitchFamily="34" charset="0"/>
+              <a:buChar char="•"/>
+              <a:defRPr/>
+            </a:pPr>
+            <a:r>
+              <a:rPr lang="en-US" dirty="0"/>
+              <a:t>Originator: Sets and Gets values from the currently targeted Memento. Creates new Mementos and assigns current values to them.</a:t>
+            </a:r>
+            <a:br>
+              <a:rPr lang="en-US" dirty="0"/>
+            </a:br>
+            <a:endParaRPr lang="en-US" dirty="0"/>
+          </a:p>
+          <a:p>
+            <a:pPr marL="457200" lvl="0" indent="-457200">
+              <a:lnSpc>
+                <a:spcPct val="90000"/>
+              </a:lnSpc>
+              <a:spcBef>
+                <a:spcPts val="1000"/>
+              </a:spcBef>
+              <a:buClr>
+                <a:srgbClr val="0070AD"/>
+              </a:buClr>
+              <a:buFont typeface="Arial" panose="020B0604020202020204" pitchFamily="34" charset="0"/>
+              <a:buChar char="•"/>
+              <a:defRPr/>
+            </a:pPr>
+            <a:r>
+              <a:rPr lang="en-US" dirty="0" err="1"/>
+              <a:t>CareTaker</a:t>
+            </a:r>
+            <a:r>
+              <a:rPr lang="en-US" dirty="0"/>
+              <a:t> (client): Holds an </a:t>
+            </a:r>
+            <a:r>
+              <a:rPr lang="en-US" dirty="0" err="1"/>
+              <a:t>ArrayList</a:t>
+            </a:r>
+            <a:r>
+              <a:rPr lang="en-US" dirty="0"/>
+              <a:t> that contains all previous versions of the Memento. It can both store and retrieve memento’s.</a:t>
+            </a:r>
+            <a:br>
+              <a:rPr lang="en-US" dirty="0"/>
+            </a:br>
+            <a:endParaRPr lang="en-US" dirty="0"/>
+          </a:p>
+        </p:txBody>
+      </p:sp>
+      <p:sp>
+        <p:nvSpPr>
+          <p:cNvPr id="11" name="Title 1">
+            <a:extLst>
+              <a:ext uri="{FF2B5EF4-FFF2-40B4-BE49-F238E27FC236}">
+                <a16:creationId xmlns:a16="http://schemas.microsoft.com/office/drawing/2014/main" id="{4894E223-C334-C948-9016-96E7D6DDB760}"/>
+              </a:ext>
+            </a:extLst>
+          </p:cNvPr>
+          <p:cNvSpPr txBox="1">
+            <a:spLocks/>
+          </p:cNvSpPr>
+          <p:nvPr/>
+        </p:nvSpPr>
+        <p:spPr>
+          <a:xfrm>
+            <a:off x="563736" y="193499"/>
+            <a:ext cx="7598487" cy="1128405"/>
+          </a:xfrm>
+          <a:prstGeom prst="rect">
+            <a:avLst/>
+          </a:prstGeom>
+        </p:spPr>
+        <p:txBody>
+          <a:bodyPr/>
+          <a:lstStyle>
+            <a:lvl1pPr marL="0" marR="0" indent="0" algn="l" defTabSz="914400" rtl="0" eaLnBrk="1" fontAlgn="auto" latinLnBrk="0" hangingPunct="1">
+              <a:lnSpc>
+                <a:spcPct val="90000"/>
+              </a:lnSpc>
+              <a:spcBef>
+                <a:spcPct val="0"/>
+              </a:spcBef>
+              <a:spcAft>
+                <a:spcPts val="0"/>
+              </a:spcAft>
+              <a:buClrTx/>
+              <a:buSzTx/>
+              <a:buFontTx/>
+              <a:buNone/>
+              <a:tabLst/>
+              <a:defRPr kumimoji="0" lang="en-US" sz="3000" b="0" i="0" u="none" strike="noStrike" kern="1200" cap="none" spc="0" normalizeH="0" baseline="0" noProof="0" dirty="0">
+                <a:ln>
+                  <a:noFill/>
+                </a:ln>
+                <a:solidFill>
+                  <a:schemeClr val="accent1"/>
+                </a:solidFill>
+                <a:effectLst/>
+                <a:uLnTx/>
+                <a:uFillTx/>
+                <a:latin typeface="+mj-lt"/>
+                <a:ea typeface="+mj-ea"/>
+                <a:cs typeface="+mj-cs"/>
+              </a:defRPr>
+            </a:lvl1pPr>
+          </a:lstStyle>
+          <a:p>
+            <a:r>
+              <a:rPr lang="en-US" dirty="0"/>
+              <a:t>Memento in detail</a:t>
+            </a:r>
+          </a:p>
+        </p:txBody>
+      </p:sp>
+      <p:pic>
+        <p:nvPicPr>
+          <p:cNvPr id="21506" name="Picture 2">
+            <a:extLst>
+              <a:ext uri="{FF2B5EF4-FFF2-40B4-BE49-F238E27FC236}">
+                <a16:creationId xmlns:a16="http://schemas.microsoft.com/office/drawing/2014/main" id="{6C0CD620-0336-D548-B6FF-A09401B328C8}"/>
+              </a:ext>
+            </a:extLst>
+          </p:cNvPr>
+          <p:cNvPicPr>
+            <a:picLocks noChangeAspect="1" noChangeArrowheads="1"/>
+          </p:cNvPicPr>
+          <p:nvPr/>
+        </p:nvPicPr>
+        <p:blipFill>
+          <a:blip r:embed="rId2">
+            <a:extLst>
+              <a:ext uri="{28A0092B-C50C-407E-A947-70E740481C1C}">
+                <a14:useLocalDpi xmlns:a14="http://schemas.microsoft.com/office/drawing/2010/main" val="0"/>
+              </a:ext>
+            </a:extLst>
+          </a:blip>
+          <a:srcRect/>
+          <a:stretch>
+            <a:fillRect/>
+          </a:stretch>
+        </p:blipFill>
+        <p:spPr bwMode="auto">
+          <a:xfrm>
+            <a:off x="1734228" y="3521999"/>
+            <a:ext cx="8636000" cy="3048000"/>
+          </a:xfrm>
+          <a:prstGeom prst="rect">
+            <a:avLst/>
+          </a:prstGeom>
+          <a:noFill/>
+          <a:extLst>
+            <a:ext uri="{909E8E84-426E-40DD-AFC4-6F175D3DCCD1}">
+              <a14:hiddenFill xmlns:a14="http://schemas.microsoft.com/office/drawing/2010/main">
+                <a:solidFill>
+                  <a:srgbClr val="FFFFFF"/>
+                </a:solidFill>
+              </a14:hiddenFill>
+            </a:ext>
+          </a:extLst>
+        </p:spPr>
+      </p:pic>
+      <p:sp>
+        <p:nvSpPr>
+          <p:cNvPr id="15" name="TextBox 14">
+            <a:extLst>
+              <a:ext uri="{FF2B5EF4-FFF2-40B4-BE49-F238E27FC236}">
+                <a16:creationId xmlns:a16="http://schemas.microsoft.com/office/drawing/2014/main" id="{B3461B0F-95ED-374D-AB2C-55D7BC4C76A3}"/>
+              </a:ext>
+            </a:extLst>
+          </p:cNvPr>
+          <p:cNvSpPr txBox="1"/>
+          <p:nvPr/>
+        </p:nvSpPr>
+        <p:spPr>
+          <a:xfrm>
+            <a:off x="2057101" y="6347746"/>
+            <a:ext cx="2305878" cy="276999"/>
+          </a:xfrm>
+          <a:prstGeom prst="rect">
+            <a:avLst/>
+          </a:prstGeom>
+          <a:noFill/>
+        </p:spPr>
+        <p:txBody>
+          <a:bodyPr wrap="square" rtlCol="0">
+            <a:spAutoFit/>
+          </a:bodyPr>
+          <a:lstStyle/>
+          <a:p>
+            <a:r>
+              <a:rPr lang="en-NL" sz="1200" dirty="0"/>
+              <a:t>Source </a:t>
+            </a:r>
+            <a:r>
+              <a:rPr lang="en-NL" sz="1200" dirty="0">
+                <a:hlinkClick r:id="rId3"/>
+              </a:rPr>
+              <a:t>Wikipedia</a:t>
+            </a:r>
+            <a:endParaRPr lang="en-NL" sz="1200" dirty="0"/>
+          </a:p>
+        </p:txBody>
+      </p:sp>
+    </p:spTree>
+    <p:extLst>
+      <p:ext uri="{BB962C8B-B14F-4D97-AF65-F5344CB8AC3E}">
+        <p14:creationId xmlns:p14="http://schemas.microsoft.com/office/powerpoint/2010/main" val="2604175150"/>
+      </p:ext>
+    </p:extLst>
+  </p:cSld>
+  <p:clrMapOvr>
+    <a:masterClrMapping/>
+  </p:clrMapOvr>
+</p:sld>
+</file>
+
+<file path=ppt/slides/slide5.xml><?xml version="1.0" encoding="utf-8"?>
+<p:sld xmlns:a="http://schemas.openxmlformats.org/drawingml/2006/main" xmlns:r="http://schemas.openxmlformats.org/officeDocument/2006/relationships" xmlns:p="http://schemas.openxmlformats.org/presentationml/2006/main">
+  <p:cSld>
+    <p:spTree>
+      <p:nvGrpSpPr>
+        <p:cNvPr id="1" name=""/>
+        <p:cNvGrpSpPr/>
+        <p:nvPr/>
+      </p:nvGrpSpPr>
+      <p:grpSpPr>
+        <a:xfrm>
+          <a:off x="0" y="0"/>
+          <a:ext cx="0" cy="0"/>
+          <a:chOff x="0" y="0"/>
+          <a:chExt cx="0" cy="0"/>
+        </a:xfrm>
+      </p:grpSpPr>
+      <p:sp>
+        <p:nvSpPr>
           <p:cNvPr id="7" name="Title 1">
             <a:extLst>
               <a:ext uri="{FF2B5EF4-FFF2-40B4-BE49-F238E27FC236}">
@@ -23570,7 +23903,7 @@
 </p:sld>
 </file>
 
-<file path=ppt/slides/slide5.xml><?xml version="1.0" encoding="utf-8"?>
+<file path=ppt/slides/slide6.xml><?xml version="1.0" encoding="utf-8"?>
 <p:sld xmlns:a="http://schemas.openxmlformats.org/drawingml/2006/main" xmlns:r="http://schemas.openxmlformats.org/officeDocument/2006/relationships" xmlns:p="http://schemas.openxmlformats.org/presentationml/2006/main">
   <p:cSld>
     <p:bg>
@@ -23688,6 +24021,42 @@
           </a:p>
         </p:txBody>
       </p:sp>
+      <p:pic>
+        <p:nvPicPr>
+          <p:cNvPr id="5" name="Picture 4" descr="Diagram&#10;&#10;Description automatically generated">
+            <a:extLst>
+              <a:ext uri="{FF2B5EF4-FFF2-40B4-BE49-F238E27FC236}">
+                <a16:creationId xmlns:a16="http://schemas.microsoft.com/office/drawing/2014/main" id="{39FBBF0F-C6F8-374D-9BCC-2992D453FB09}"/>
+              </a:ext>
+            </a:extLst>
+          </p:cNvPr>
+          <p:cNvPicPr>
+            <a:picLocks noChangeAspect="1"/>
+          </p:cNvPicPr>
+          <p:nvPr/>
+        </p:nvPicPr>
+        <p:blipFill>
+          <a:blip r:embed="rId4">
+            <a:extLst>
+              <a:ext uri="{28A0092B-C50C-407E-A947-70E740481C1C}">
+                <a14:useLocalDpi xmlns:a14="http://schemas.microsoft.com/office/drawing/2010/main" val="0"/>
+              </a:ext>
+            </a:extLst>
+          </a:blip>
+          <a:stretch>
+            <a:fillRect/>
+          </a:stretch>
+        </p:blipFill>
+        <p:spPr>
+          <a:xfrm>
+            <a:off x="1349741" y="3685682"/>
+            <a:ext cx="9492516" cy="1764213"/>
+          </a:xfrm>
+          <a:prstGeom prst="rect">
+            <a:avLst/>
+          </a:prstGeom>
+        </p:spPr>
+      </p:pic>
     </p:spTree>
     <p:extLst>
       <p:ext uri="{BB962C8B-B14F-4D97-AF65-F5344CB8AC3E}">
@@ -23701,7 +24070,7 @@
 </p:sld>
 </file>
 
-<file path=ppt/slides/slide6.xml><?xml version="1.0" encoding="utf-8"?>
+<file path=ppt/slides/slide7.xml><?xml version="1.0" encoding="utf-8"?>
 <p:sld xmlns:a="http://schemas.openxmlformats.org/drawingml/2006/main" xmlns:r="http://schemas.openxmlformats.org/officeDocument/2006/relationships" xmlns:p="http://schemas.openxmlformats.org/presentationml/2006/main">
   <p:cSld>
     <p:spTree>

</xml_diff>

<commit_message>
Updated ppt, removed unused import.
</commit_message>
<xml_diff>
--- a/design_patterns_for_lunch_memento - 27-10-2020.pptx
+++ b/design_patterns_for_lunch_memento - 27-10-2020.pptx
@@ -8,16 +8,17 @@
     <p:sldMasterId id="2147483866" r:id="rId4"/>
   </p:sldMasterIdLst>
   <p:notesMasterIdLst>
-    <p:notesMasterId r:id="rId12"/>
+    <p:notesMasterId r:id="rId13"/>
   </p:notesMasterIdLst>
   <p:sldIdLst>
     <p:sldId id="257" r:id="rId5"/>
     <p:sldId id="351" r:id="rId6"/>
     <p:sldId id="353" r:id="rId7"/>
-    <p:sldId id="359" r:id="rId8"/>
-    <p:sldId id="358" r:id="rId9"/>
-    <p:sldId id="357" r:id="rId10"/>
-    <p:sldId id="258" r:id="rId11"/>
+    <p:sldId id="360" r:id="rId8"/>
+    <p:sldId id="359" r:id="rId9"/>
+    <p:sldId id="358" r:id="rId10"/>
+    <p:sldId id="357" r:id="rId11"/>
+    <p:sldId id="258" r:id="rId12"/>
   </p:sldIdLst>
   <p:sldSz cx="12192000" cy="6858000"/>
   <p:notesSz cx="6858000" cy="9144000"/>
@@ -805,7 +806,7 @@
           <a:p>
             <a:fld id="{FE95A6A2-1E30-439E-B803-AFE55DB3F8FB}" type="slidenum">
               <a:rPr lang="nl-NL" smtClean="0"/>
-              <a:t>5</a:t>
+              <a:t>6</a:t>
             </a:fld>
             <a:endParaRPr lang="nl-NL"/>
           </a:p>
@@ -889,7 +890,7 @@
           <a:p>
             <a:fld id="{FE95A6A2-1E30-439E-B803-AFE55DB3F8FB}" type="slidenum">
               <a:rPr lang="nl-NL" smtClean="0"/>
-              <a:t>6</a:t>
+              <a:t>7</a:t>
             </a:fld>
             <a:endParaRPr lang="nl-NL"/>
           </a:p>
@@ -945,7 +946,7 @@
           <a:graphicData uri="http://schemas.openxmlformats.org/presentationml/2006/ole">
             <mc:AlternateContent xmlns:mc="http://schemas.openxmlformats.org/markup-compatibility/2006">
               <mc:Choice xmlns:v="urn:schemas-microsoft-com:vml" Requires="v">
-                <p:oleObj spid="_x0000_s3131" name="think-cell Slide" r:id="rId4" imgW="270" imgH="270" progId="TCLayout.ActiveDocument.1">
+                <p:oleObj spid="_x0000_s3135" name="think-cell Slide" r:id="rId4" imgW="270" imgH="270" progId="TCLayout.ActiveDocument.1">
                   <p:embed/>
                 </p:oleObj>
               </mc:Choice>
@@ -3752,7 +3753,7 @@
           </a:ln>
           <a:extLst>
             <a:ext uri="{91240B29-F687-4f45-9708-019B960494DF}">
-              <a14:hiddenLine xmlns:a14="http://schemas.microsoft.com/office/drawing/2010/main" xmlns="" w="9525">
+              <a14:hiddenLine xmlns="" xmlns:a14="http://schemas.microsoft.com/office/drawing/2010/main" w="9525">
                 <a:solidFill>
                   <a:srgbClr val="000000"/>
                 </a:solidFill>
@@ -3924,7 +3925,7 @@
             </a:ln>
             <a:extLst>
               <a:ext uri="{91240B29-F687-4f45-9708-019B960494DF}">
-                <a14:hiddenLine xmlns:a14="http://schemas.microsoft.com/office/drawing/2010/main" xmlns="" w="9525">
+                <a14:hiddenLine xmlns="" xmlns:a14="http://schemas.microsoft.com/office/drawing/2010/main" w="9525">
                   <a:solidFill>
                     <a:srgbClr val="000000"/>
                   </a:solidFill>
@@ -4105,7 +4106,7 @@
             </a:ln>
             <a:extLst>
               <a:ext uri="{91240B29-F687-4f45-9708-019B960494DF}">
-                <a14:hiddenLine xmlns:a14="http://schemas.microsoft.com/office/drawing/2010/main" xmlns="" w="9525">
+                <a14:hiddenLine xmlns="" xmlns:a14="http://schemas.microsoft.com/office/drawing/2010/main" w="9525">
                   <a:solidFill>
                     <a:srgbClr val="000000"/>
                   </a:solidFill>
@@ -4913,7 +4914,7 @@
             </a:ln>
             <a:extLst>
               <a:ext uri="{91240B29-F687-4f45-9708-019B960494DF}">
-                <a14:hiddenLine xmlns="" xmlns:a14="http://schemas.microsoft.com/office/drawing/2010/main" w="9525">
+                <a14:hiddenLine xmlns:a14="http://schemas.microsoft.com/office/drawing/2010/main" xmlns="" w="9525">
                   <a:solidFill>
                     <a:srgbClr val="000000"/>
                   </a:solidFill>
@@ -5294,7 +5295,7 @@
             </a:ln>
             <a:extLst>
               <a:ext uri="{91240B29-F687-4f45-9708-019B960494DF}">
-                <a14:hiddenLine xmlns="" xmlns:a14="http://schemas.microsoft.com/office/drawing/2010/main" w="9525">
+                <a14:hiddenLine xmlns:a14="http://schemas.microsoft.com/office/drawing/2010/main" xmlns="" w="9525">
                   <a:solidFill>
                     <a:srgbClr val="000000"/>
                   </a:solidFill>
@@ -5607,7 +5608,7 @@
             </a:ln>
             <a:extLst>
               <a:ext uri="{91240B29-F687-4f45-9708-019B960494DF}">
-                <a14:hiddenLine xmlns="" xmlns:a14="http://schemas.microsoft.com/office/drawing/2010/main" w="9525">
+                <a14:hiddenLine xmlns:a14="http://schemas.microsoft.com/office/drawing/2010/main" xmlns="" w="9525">
                   <a:solidFill>
                     <a:srgbClr val="000000"/>
                   </a:solidFill>
@@ -5920,7 +5921,7 @@
             </a:ln>
             <a:extLst>
               <a:ext uri="{91240B29-F687-4f45-9708-019B960494DF}">
-                <a14:hiddenLine xmlns="" xmlns:a14="http://schemas.microsoft.com/office/drawing/2010/main" w="9525">
+                <a14:hiddenLine xmlns:a14="http://schemas.microsoft.com/office/drawing/2010/main" xmlns="" w="9525">
                   <a:solidFill>
                     <a:srgbClr val="000000"/>
                   </a:solidFill>
@@ -6102,7 +6103,7 @@
             </a:ln>
             <a:extLst>
               <a:ext uri="{91240B29-F687-4f45-9708-019B960494DF}">
-                <a14:hiddenLine xmlns="" xmlns:a14="http://schemas.microsoft.com/office/drawing/2010/main" w="9525">
+                <a14:hiddenLine xmlns:a14="http://schemas.microsoft.com/office/drawing/2010/main" xmlns="" w="9525">
                   <a:solidFill>
                     <a:srgbClr val="000000"/>
                   </a:solidFill>
@@ -6483,7 +6484,7 @@
             </a:ln>
             <a:extLst>
               <a:ext uri="{91240B29-F687-4f45-9708-019B960494DF}">
-                <a14:hiddenLine xmlns="" xmlns:a14="http://schemas.microsoft.com/office/drawing/2010/main" w="9525">
+                <a14:hiddenLine xmlns:a14="http://schemas.microsoft.com/office/drawing/2010/main" xmlns="" w="9525">
                   <a:solidFill>
                     <a:srgbClr val="000000"/>
                   </a:solidFill>
@@ -6855,7 +6856,7 @@
             </a:ln>
             <a:extLst>
               <a:ext uri="{91240B29-F687-4f45-9708-019B960494DF}">
-                <a14:hiddenLine xmlns="" xmlns:a14="http://schemas.microsoft.com/office/drawing/2010/main" w="9525">
+                <a14:hiddenLine xmlns:a14="http://schemas.microsoft.com/office/drawing/2010/main" xmlns="" w="9525">
                   <a:solidFill>
                     <a:srgbClr val="000000"/>
                   </a:solidFill>
@@ -7298,7 +7299,7 @@
             </a:ln>
             <a:extLst>
               <a:ext uri="{91240B29-F687-4f45-9708-019B960494DF}">
-                <a14:hiddenLine xmlns="" xmlns:a14="http://schemas.microsoft.com/office/drawing/2010/main" w="9525">
+                <a14:hiddenLine xmlns:a14="http://schemas.microsoft.com/office/drawing/2010/main" xmlns="" w="9525">
                   <a:solidFill>
                     <a:srgbClr val="000000"/>
                   </a:solidFill>
@@ -7540,7 +7541,7 @@
             </a:ln>
             <a:extLst>
               <a:ext uri="{91240B29-F687-4f45-9708-019B960494DF}">
-                <a14:hiddenLine xmlns="" xmlns:a14="http://schemas.microsoft.com/office/drawing/2010/main" w="9525">
+                <a14:hiddenLine xmlns:a14="http://schemas.microsoft.com/office/drawing/2010/main" xmlns="" w="9525">
                   <a:solidFill>
                     <a:srgbClr val="000000"/>
                   </a:solidFill>
@@ -7782,7 +7783,7 @@
             </a:ln>
             <a:extLst>
               <a:ext uri="{91240B29-F687-4f45-9708-019B960494DF}">
-                <a14:hiddenLine xmlns="" xmlns:a14="http://schemas.microsoft.com/office/drawing/2010/main" w="9525">
+                <a14:hiddenLine xmlns:a14="http://schemas.microsoft.com/office/drawing/2010/main" xmlns="" w="9525">
                   <a:solidFill>
                     <a:srgbClr val="000000"/>
                   </a:solidFill>
@@ -8163,7 +8164,7 @@
             </a:ln>
             <a:extLst>
               <a:ext uri="{91240B29-F687-4f45-9708-019B960494DF}">
-                <a14:hiddenLine xmlns="" xmlns:a14="http://schemas.microsoft.com/office/drawing/2010/main" w="9525">
+                <a14:hiddenLine xmlns:a14="http://schemas.microsoft.com/office/drawing/2010/main" xmlns="" w="9525">
                   <a:solidFill>
                     <a:srgbClr val="000000"/>
                   </a:solidFill>
@@ -8365,7 +8366,7 @@
             </a:ln>
             <a:extLst>
               <a:ext uri="{91240B29-F687-4f45-9708-019B960494DF}">
-                <a14:hiddenLine xmlns="" xmlns:a14="http://schemas.microsoft.com/office/drawing/2010/main" w="9525">
+                <a14:hiddenLine xmlns:a14="http://schemas.microsoft.com/office/drawing/2010/main" xmlns="" w="9525">
                   <a:solidFill>
                     <a:srgbClr val="000000"/>
                   </a:solidFill>
@@ -8527,7 +8528,7 @@
             </a:ln>
             <a:extLst>
               <a:ext uri="{91240B29-F687-4f45-9708-019B960494DF}">
-                <a14:hiddenLine xmlns="" xmlns:a14="http://schemas.microsoft.com/office/drawing/2010/main" w="9525">
+                <a14:hiddenLine xmlns:a14="http://schemas.microsoft.com/office/drawing/2010/main" xmlns="" w="9525">
                   <a:solidFill>
                     <a:srgbClr val="000000"/>
                   </a:solidFill>
@@ -8729,7 +8730,7 @@
             </a:ln>
             <a:extLst>
               <a:ext uri="{91240B29-F687-4f45-9708-019B960494DF}">
-                <a14:hiddenLine xmlns="" xmlns:a14="http://schemas.microsoft.com/office/drawing/2010/main" w="9525">
+                <a14:hiddenLine xmlns:a14="http://schemas.microsoft.com/office/drawing/2010/main" xmlns="" w="9525">
                   <a:solidFill>
                     <a:srgbClr val="000000"/>
                   </a:solidFill>
@@ -9110,7 +9111,7 @@
             </a:ln>
             <a:extLst>
               <a:ext uri="{91240B29-F687-4f45-9708-019B960494DF}">
-                <a14:hiddenLine xmlns="" xmlns:a14="http://schemas.microsoft.com/office/drawing/2010/main" w="9525">
+                <a14:hiddenLine xmlns:a14="http://schemas.microsoft.com/office/drawing/2010/main" xmlns="" w="9525">
                   <a:solidFill>
                     <a:srgbClr val="000000"/>
                   </a:solidFill>
@@ -9494,7 +9495,7 @@
             </a:ln>
             <a:extLst>
               <a:ext uri="{91240B29-F687-4f45-9708-019B960494DF}">
-                <a14:hiddenLine xmlns="" xmlns:a14="http://schemas.microsoft.com/office/drawing/2010/main" w="9525">
+                <a14:hiddenLine xmlns:a14="http://schemas.microsoft.com/office/drawing/2010/main" xmlns="" w="9525">
                   <a:solidFill>
                     <a:srgbClr val="000000"/>
                   </a:solidFill>
@@ -9716,7 +9717,7 @@
             </a:ln>
             <a:extLst>
               <a:ext uri="{91240B29-F687-4f45-9708-019B960494DF}">
-                <a14:hiddenLine xmlns="" xmlns:a14="http://schemas.microsoft.com/office/drawing/2010/main" w="9525">
+                <a14:hiddenLine xmlns:a14="http://schemas.microsoft.com/office/drawing/2010/main" xmlns="" w="9525">
                   <a:solidFill>
                     <a:srgbClr val="000000"/>
                   </a:solidFill>
@@ -9898,7 +9899,7 @@
             </a:ln>
             <a:extLst>
               <a:ext uri="{91240B29-F687-4f45-9708-019B960494DF}">
-                <a14:hiddenLine xmlns="" xmlns:a14="http://schemas.microsoft.com/office/drawing/2010/main" w="9525">
+                <a14:hiddenLine xmlns:a14="http://schemas.microsoft.com/office/drawing/2010/main" xmlns="" w="9525">
                   <a:solidFill>
                     <a:srgbClr val="000000"/>
                   </a:solidFill>
@@ -10140,7 +10141,7 @@
             </a:ln>
             <a:extLst>
               <a:ext uri="{91240B29-F687-4f45-9708-019B960494DF}">
-                <a14:hiddenLine xmlns="" xmlns:a14="http://schemas.microsoft.com/office/drawing/2010/main" w="9525">
+                <a14:hiddenLine xmlns:a14="http://schemas.microsoft.com/office/drawing/2010/main" xmlns="" w="9525">
                   <a:solidFill>
                     <a:srgbClr val="000000"/>
                   </a:solidFill>
@@ -10524,7 +10525,7 @@
             </a:ln>
             <a:extLst>
               <a:ext uri="{91240B29-F687-4f45-9708-019B960494DF}">
-                <a14:hiddenLine xmlns="" xmlns:a14="http://schemas.microsoft.com/office/drawing/2010/main" w="9525">
+                <a14:hiddenLine xmlns:a14="http://schemas.microsoft.com/office/drawing/2010/main" xmlns="" w="9525">
                   <a:solidFill>
                     <a:srgbClr val="000000"/>
                   </a:solidFill>
@@ -10798,7 +10799,7 @@
             </a:ln>
             <a:extLst>
               <a:ext uri="{91240B29-F687-4f45-9708-019B960494DF}">
-                <a14:hiddenLine xmlns="" xmlns:a14="http://schemas.microsoft.com/office/drawing/2010/main" w="9525">
+                <a14:hiddenLine xmlns:a14="http://schemas.microsoft.com/office/drawing/2010/main" xmlns="" w="9525">
                   <a:solidFill>
                     <a:srgbClr val="000000"/>
                   </a:solidFill>
@@ -11111,7 +11112,7 @@
             </a:ln>
             <a:extLst>
               <a:ext uri="{91240B29-F687-4f45-9708-019B960494DF}">
-                <a14:hiddenLine xmlns="" xmlns:a14="http://schemas.microsoft.com/office/drawing/2010/main" w="9525">
+                <a14:hiddenLine xmlns:a14="http://schemas.microsoft.com/office/drawing/2010/main" xmlns="" w="9525">
                   <a:solidFill>
                     <a:srgbClr val="000000"/>
                   </a:solidFill>
@@ -11333,7 +11334,7 @@
             </a:ln>
             <a:extLst>
               <a:ext uri="{91240B29-F687-4f45-9708-019B960494DF}">
-                <a14:hiddenLine xmlns="" xmlns:a14="http://schemas.microsoft.com/office/drawing/2010/main" w="9525">
+                <a14:hiddenLine xmlns:a14="http://schemas.microsoft.com/office/drawing/2010/main" xmlns="" w="9525">
                   <a:solidFill>
                     <a:srgbClr val="000000"/>
                   </a:solidFill>
@@ -11575,7 +11576,7 @@
             </a:ln>
             <a:extLst>
               <a:ext uri="{91240B29-F687-4f45-9708-019B960494DF}">
-                <a14:hiddenLine xmlns="" xmlns:a14="http://schemas.microsoft.com/office/drawing/2010/main" w="9525">
+                <a14:hiddenLine xmlns:a14="http://schemas.microsoft.com/office/drawing/2010/main" xmlns="" w="9525">
                   <a:solidFill>
                     <a:srgbClr val="000000"/>
                   </a:solidFill>
@@ -11817,7 +11818,7 @@
             </a:ln>
             <a:extLst>
               <a:ext uri="{91240B29-F687-4f45-9708-019B960494DF}">
-                <a14:hiddenLine xmlns="" xmlns:a14="http://schemas.microsoft.com/office/drawing/2010/main" w="9525">
+                <a14:hiddenLine xmlns:a14="http://schemas.microsoft.com/office/drawing/2010/main" xmlns="" w="9525">
                   <a:solidFill>
                     <a:srgbClr val="000000"/>
                   </a:solidFill>
@@ -11961,7 +11962,7 @@
             </a:ln>
             <a:extLst>
               <a:ext uri="{91240B29-F687-4f45-9708-019B960494DF}">
-                <a14:hiddenLine xmlns="" xmlns:a14="http://schemas.microsoft.com/office/drawing/2010/main" w="9525">
+                <a14:hiddenLine xmlns:a14="http://schemas.microsoft.com/office/drawing/2010/main" xmlns="" w="9525">
                   <a:solidFill>
                     <a:srgbClr val="000000"/>
                   </a:solidFill>
@@ -12688,7 +12689,7 @@
           <a:graphicData uri="http://schemas.openxmlformats.org/presentationml/2006/ole">
             <mc:AlternateContent xmlns:mc="http://schemas.openxmlformats.org/markup-compatibility/2006">
               <mc:Choice xmlns:v="urn:schemas-microsoft-com:vml" Requires="v">
-                <p:oleObj spid="_x0000_s16442" name="think-cell Slide" r:id="rId4" imgW="270" imgH="270" progId="TCLayout.ActiveDocument.1">
+                <p:oleObj spid="_x0000_s16446" name="think-cell Slide" r:id="rId4" imgW="270" imgH="270" progId="TCLayout.ActiveDocument.1">
                   <p:embed/>
                 </p:oleObj>
               </mc:Choice>
@@ -13797,7 +13798,7 @@
           <a:graphicData uri="http://schemas.openxmlformats.org/presentationml/2006/ole">
             <mc:AlternateContent xmlns:mc="http://schemas.openxmlformats.org/markup-compatibility/2006">
               <mc:Choice xmlns:v="urn:schemas-microsoft-com:vml" Requires="v">
-                <p:oleObj spid="_x0000_s18490" name="think-cell Slide" r:id="rId4" imgW="270" imgH="270" progId="TCLayout.ActiveDocument.1">
+                <p:oleObj spid="_x0000_s18494" name="think-cell Slide" r:id="rId4" imgW="270" imgH="270" progId="TCLayout.ActiveDocument.1">
                   <p:embed/>
                 </p:oleObj>
               </mc:Choice>
@@ -14745,7 +14746,7 @@
           <a:graphicData uri="http://schemas.openxmlformats.org/presentationml/2006/ole">
             <mc:AlternateContent xmlns:mc="http://schemas.openxmlformats.org/markup-compatibility/2006">
               <mc:Choice xmlns:v="urn:schemas-microsoft-com:vml" Requires="v">
-                <p:oleObj spid="_x0000_s2107" name="think-cell Slide" r:id="rId5" imgW="270" imgH="270" progId="TCLayout.ActiveDocument.1">
+                <p:oleObj spid="_x0000_s2111" name="think-cell Slide" r:id="rId5" imgW="270" imgH="270" progId="TCLayout.ActiveDocument.1">
                   <p:embed/>
                 </p:oleObj>
               </mc:Choice>
@@ -15475,7 +15476,7 @@
           <a:graphicData uri="http://schemas.openxmlformats.org/presentationml/2006/ole">
             <mc:AlternateContent xmlns:mc="http://schemas.openxmlformats.org/markup-compatibility/2006">
               <mc:Choice xmlns:v="urn:schemas-microsoft-com:vml" Requires="v">
-                <p:oleObj spid="_x0000_s4155" name="think-cell Slide" r:id="rId6" imgW="270" imgH="270" progId="TCLayout.ActiveDocument.1">
+                <p:oleObj spid="_x0000_s4159" name="think-cell Slide" r:id="rId6" imgW="270" imgH="270" progId="TCLayout.ActiveDocument.1">
                   <p:embed/>
                 </p:oleObj>
               </mc:Choice>
@@ -15905,7 +15906,7 @@
           <a:graphicData uri="http://schemas.openxmlformats.org/presentationml/2006/ole">
             <mc:AlternateContent xmlns:mc="http://schemas.openxmlformats.org/markup-compatibility/2006">
               <mc:Choice xmlns:v="urn:schemas-microsoft-com:vml" Requires="v">
-                <p:oleObj spid="_x0000_s15419" name="think-cell Slide" r:id="rId6" imgW="270" imgH="270" progId="TCLayout.ActiveDocument.1">
+                <p:oleObj spid="_x0000_s15423" name="think-cell Slide" r:id="rId6" imgW="270" imgH="270" progId="TCLayout.ActiveDocument.1">
                   <p:embed/>
                 </p:oleObj>
               </mc:Choice>
@@ -18337,7 +18338,7 @@
           <a:graphicData uri="http://schemas.openxmlformats.org/presentationml/2006/ole">
             <mc:AlternateContent xmlns:mc="http://schemas.openxmlformats.org/markup-compatibility/2006">
               <mc:Choice xmlns:v="urn:schemas-microsoft-com:vml" Requires="v">
-                <p:oleObj spid="_x0000_s1083" name="think-cell Slide" r:id="rId5" imgW="270" imgH="270" progId="TCLayout.ActiveDocument.1">
+                <p:oleObj spid="_x0000_s1087" name="think-cell Slide" r:id="rId5" imgW="270" imgH="270" progId="TCLayout.ActiveDocument.1">
                   <p:embed/>
                 </p:oleObj>
               </mc:Choice>
@@ -19711,7 +19712,7 @@
           <a:graphicData uri="http://schemas.openxmlformats.org/presentationml/2006/ole">
             <mc:AlternateContent xmlns:mc="http://schemas.openxmlformats.org/markup-compatibility/2006">
               <mc:Choice xmlns:v="urn:schemas-microsoft-com:vml" Requires="v">
-                <p:oleObj spid="_x0000_s17469" name="think-cell Slide" r:id="rId5" imgW="270" imgH="270" progId="TCLayout.ActiveDocument.1">
+                <p:oleObj spid="_x0000_s17473" name="think-cell Slide" r:id="rId5" imgW="270" imgH="270" progId="TCLayout.ActiveDocument.1">
                   <p:embed/>
                 </p:oleObj>
               </mc:Choice>
@@ -19994,14 +19995,14 @@
           </a:lstStyle>
           <a:p>
             <a:r>
-              <a:rPr lang="en-US" dirty="0"/>
+              <a:rPr lang="en-US" sz="2000" dirty="0"/>
               <a:t>Lars </a:t>
             </a:r>
             <a:r>
-              <a:rPr lang="en-US" dirty="0" err="1"/>
+              <a:rPr lang="en-US" sz="2000" dirty="0" err="1"/>
               <a:t>Mudde</a:t>
             </a:r>
-            <a:endParaRPr lang="en-US" dirty="0"/>
+            <a:endParaRPr lang="en-US" sz="2000" dirty="0"/>
           </a:p>
         </p:txBody>
       </p:sp>
@@ -20211,37 +20212,37 @@
           <a:p>
             <a:pPr marL="179388" lvl="1"/>
             <a:r>
-              <a:rPr lang="en-US" dirty="0"/>
+              <a:rPr lang="en-US" sz="1600" dirty="0"/>
               <a:t>AMS N21 Software developer</a:t>
             </a:r>
           </a:p>
           <a:p>
             <a:pPr marL="179388" lvl="1"/>
             <a:r>
-              <a:rPr lang="en-US" dirty="0"/>
+              <a:rPr lang="en-US" sz="1600" dirty="0"/>
               <a:t>Proud member of </a:t>
             </a:r>
             <a:r>
-              <a:rPr lang="en-US" dirty="0" err="1"/>
+              <a:rPr lang="en-US" sz="1600" dirty="0" err="1"/>
               <a:t>DigiD</a:t>
             </a:r>
             <a:r>
-              <a:rPr lang="en-US" dirty="0"/>
+              <a:rPr lang="en-US" sz="1600" dirty="0"/>
               <a:t> </a:t>
             </a:r>
             <a:r>
-              <a:rPr lang="en-US" dirty="0" err="1"/>
+              <a:rPr lang="en-US" sz="1600" dirty="0" err="1"/>
               <a:t>Machtigen</a:t>
             </a:r>
             <a:r>
-              <a:rPr lang="en-US" dirty="0"/>
+              <a:rPr lang="en-US" sz="1600" dirty="0"/>
               <a:t> team </a:t>
             </a:r>
             <a:r>
-              <a:rPr lang="en-US" dirty="0" err="1"/>
+              <a:rPr lang="en-US" sz="1600" dirty="0" err="1"/>
               <a:t>Delorean</a:t>
             </a:r>
-            <a:endParaRPr lang="en-US" dirty="0"/>
+            <a:endParaRPr lang="en-US" sz="1600" dirty="0"/>
           </a:p>
           <a:p>
             <a:pPr marL="179388" lvl="1"/>
@@ -23271,6 +23272,83 @@
           <a:chExt cx="0" cy="0"/>
         </a:xfrm>
       </p:grpSpPr>
+      <p:pic>
+        <p:nvPicPr>
+          <p:cNvPr id="4" name="Picture 2" descr="Review: Ctrl+Z, by Meg Leta Jones | THE Books">
+            <a:extLst>
+              <a:ext uri="{FF2B5EF4-FFF2-40B4-BE49-F238E27FC236}">
+                <a16:creationId xmlns:a16="http://schemas.microsoft.com/office/drawing/2014/main" id="{A9CD9855-F751-AA42-A37B-1E1EA80AD077}"/>
+              </a:ext>
+            </a:extLst>
+          </p:cNvPr>
+          <p:cNvPicPr>
+            <a:picLocks noChangeAspect="1" noChangeArrowheads="1"/>
+          </p:cNvPicPr>
+          <p:nvPr/>
+        </p:nvPicPr>
+        <p:blipFill>
+          <a:blip r:embed="rId2">
+            <a:extLst>
+              <a:ext uri="{28A0092B-C50C-407E-A947-70E740481C1C}">
+                <a14:useLocalDpi xmlns:a14="http://schemas.microsoft.com/office/drawing/2010/main" val="0"/>
+              </a:ext>
+            </a:extLst>
+          </a:blip>
+          <a:srcRect/>
+          <a:stretch>
+            <a:fillRect/>
+          </a:stretch>
+        </p:blipFill>
+        <p:spPr bwMode="auto">
+          <a:xfrm>
+            <a:off x="1862395" y="606596"/>
+            <a:ext cx="8467210" cy="5644807"/>
+          </a:xfrm>
+          <a:prstGeom prst="rect">
+            <a:avLst/>
+          </a:prstGeom>
+          <a:noFill/>
+          <a:extLst>
+            <a:ext uri="{909E8E84-426E-40DD-AFC4-6F175D3DCCD1}">
+              <a14:hiddenFill xmlns:a14="http://schemas.microsoft.com/office/drawing/2010/main">
+                <a:solidFill>
+                  <a:srgbClr val="FFFFFF"/>
+                </a:solidFill>
+              </a14:hiddenFill>
+            </a:ext>
+          </a:extLst>
+        </p:spPr>
+      </p:pic>
+    </p:spTree>
+    <p:extLst>
+      <p:ext uri="{BB962C8B-B14F-4D97-AF65-F5344CB8AC3E}">
+        <p14:creationId xmlns:p14="http://schemas.microsoft.com/office/powerpoint/2010/main" val="1096347769"/>
+      </p:ext>
+    </p:extLst>
+  </p:cSld>
+  <p:clrMapOvr>
+    <a:masterClrMapping/>
+  </p:clrMapOvr>
+</p:sld>
+</file>
+
+<file path=ppt/slides/slide5.xml><?xml version="1.0" encoding="utf-8"?>
+<p:sld xmlns:a="http://schemas.openxmlformats.org/drawingml/2006/main" xmlns:r="http://schemas.openxmlformats.org/officeDocument/2006/relationships" xmlns:p="http://schemas.openxmlformats.org/presentationml/2006/main">
+  <p:cSld>
+    <p:spTree>
+      <p:nvGrpSpPr>
+        <p:cNvPr id="1" name=""/>
+        <p:cNvGrpSpPr/>
+        <p:nvPr/>
+      </p:nvGrpSpPr>
+      <p:grpSpPr>
+        <a:xfrm>
+          <a:off x="0" y="0"/>
+          <a:ext cx="0" cy="0"/>
+          <a:chOff x="0" y="0"/>
+          <a:chExt cx="0" cy="0"/>
+        </a:xfrm>
+      </p:grpSpPr>
       <p:sp>
         <p:nvSpPr>
           <p:cNvPr id="10" name="Text Placeholder 10">
@@ -23574,7 +23652,7 @@
 </p:sld>
 </file>
 
-<file path=ppt/slides/slide5.xml><?xml version="1.0" encoding="utf-8"?>
+<file path=ppt/slides/slide6.xml><?xml version="1.0" encoding="utf-8"?>
 <p:sld xmlns:a="http://schemas.openxmlformats.org/drawingml/2006/main" xmlns:r="http://schemas.openxmlformats.org/officeDocument/2006/relationships" xmlns:p="http://schemas.openxmlformats.org/presentationml/2006/main">
   <p:cSld>
     <p:spTree>
@@ -23903,7 +23981,7 @@
 </p:sld>
 </file>
 
-<file path=ppt/slides/slide6.xml><?xml version="1.0" encoding="utf-8"?>
+<file path=ppt/slides/slide7.xml><?xml version="1.0" encoding="utf-8"?>
 <p:sld xmlns:a="http://schemas.openxmlformats.org/drawingml/2006/main" xmlns:r="http://schemas.openxmlformats.org/officeDocument/2006/relationships" xmlns:p="http://schemas.openxmlformats.org/presentationml/2006/main">
   <p:cSld>
     <p:bg>
@@ -24070,7 +24148,7 @@
 </p:sld>
 </file>
 
-<file path=ppt/slides/slide7.xml><?xml version="1.0" encoding="utf-8"?>
+<file path=ppt/slides/slide8.xml><?xml version="1.0" encoding="utf-8"?>
 <p:sld xmlns:a="http://schemas.openxmlformats.org/drawingml/2006/main" xmlns:r="http://schemas.openxmlformats.org/officeDocument/2006/relationships" xmlns:p="http://schemas.openxmlformats.org/presentationml/2006/main">
   <p:cSld>
     <p:spTree>

</xml_diff>

<commit_message>
Final commit on memento ppt
</commit_message>
<xml_diff>
--- a/design_patterns_for_lunch_memento - 27-10-2020.pptx
+++ b/design_patterns_for_lunch_memento - 27-10-2020.pptx
@@ -946,7 +946,7 @@
           <a:graphicData uri="http://schemas.openxmlformats.org/presentationml/2006/ole">
             <mc:AlternateContent xmlns:mc="http://schemas.openxmlformats.org/markup-compatibility/2006">
               <mc:Choice xmlns:v="urn:schemas-microsoft-com:vml" Requires="v">
-                <p:oleObj spid="_x0000_s3136" name="think-cell Slide" r:id="rId4" imgW="270" imgH="270" progId="TCLayout.ActiveDocument.1">
+                <p:oleObj spid="_x0000_s3137" name="think-cell Slide" r:id="rId4" imgW="270" imgH="270" progId="TCLayout.ActiveDocument.1">
                   <p:embed/>
                 </p:oleObj>
               </mc:Choice>
@@ -12689,7 +12689,7 @@
           <a:graphicData uri="http://schemas.openxmlformats.org/presentationml/2006/ole">
             <mc:AlternateContent xmlns:mc="http://schemas.openxmlformats.org/markup-compatibility/2006">
               <mc:Choice xmlns:v="urn:schemas-microsoft-com:vml" Requires="v">
-                <p:oleObj spid="_x0000_s16447" name="think-cell Slide" r:id="rId4" imgW="270" imgH="270" progId="TCLayout.ActiveDocument.1">
+                <p:oleObj spid="_x0000_s16448" name="think-cell Slide" r:id="rId4" imgW="270" imgH="270" progId="TCLayout.ActiveDocument.1">
                   <p:embed/>
                 </p:oleObj>
               </mc:Choice>
@@ -13798,7 +13798,7 @@
           <a:graphicData uri="http://schemas.openxmlformats.org/presentationml/2006/ole">
             <mc:AlternateContent xmlns:mc="http://schemas.openxmlformats.org/markup-compatibility/2006">
               <mc:Choice xmlns:v="urn:schemas-microsoft-com:vml" Requires="v">
-                <p:oleObj spid="_x0000_s18495" name="think-cell Slide" r:id="rId4" imgW="270" imgH="270" progId="TCLayout.ActiveDocument.1">
+                <p:oleObj spid="_x0000_s18496" name="think-cell Slide" r:id="rId4" imgW="270" imgH="270" progId="TCLayout.ActiveDocument.1">
                   <p:embed/>
                 </p:oleObj>
               </mc:Choice>
@@ -14746,7 +14746,7 @@
           <a:graphicData uri="http://schemas.openxmlformats.org/presentationml/2006/ole">
             <mc:AlternateContent xmlns:mc="http://schemas.openxmlformats.org/markup-compatibility/2006">
               <mc:Choice xmlns:v="urn:schemas-microsoft-com:vml" Requires="v">
-                <p:oleObj spid="_x0000_s2112" name="think-cell Slide" r:id="rId5" imgW="270" imgH="270" progId="TCLayout.ActiveDocument.1">
+                <p:oleObj spid="_x0000_s2113" name="think-cell Slide" r:id="rId5" imgW="270" imgH="270" progId="TCLayout.ActiveDocument.1">
                   <p:embed/>
                 </p:oleObj>
               </mc:Choice>
@@ -15476,7 +15476,7 @@
           <a:graphicData uri="http://schemas.openxmlformats.org/presentationml/2006/ole">
             <mc:AlternateContent xmlns:mc="http://schemas.openxmlformats.org/markup-compatibility/2006">
               <mc:Choice xmlns:v="urn:schemas-microsoft-com:vml" Requires="v">
-                <p:oleObj spid="_x0000_s4160" name="think-cell Slide" r:id="rId6" imgW="270" imgH="270" progId="TCLayout.ActiveDocument.1">
+                <p:oleObj spid="_x0000_s4161" name="think-cell Slide" r:id="rId6" imgW="270" imgH="270" progId="TCLayout.ActiveDocument.1">
                   <p:embed/>
                 </p:oleObj>
               </mc:Choice>
@@ -15906,7 +15906,7 @@
           <a:graphicData uri="http://schemas.openxmlformats.org/presentationml/2006/ole">
             <mc:AlternateContent xmlns:mc="http://schemas.openxmlformats.org/markup-compatibility/2006">
               <mc:Choice xmlns:v="urn:schemas-microsoft-com:vml" Requires="v">
-                <p:oleObj spid="_x0000_s15424" name="think-cell Slide" r:id="rId6" imgW="270" imgH="270" progId="TCLayout.ActiveDocument.1">
+                <p:oleObj spid="_x0000_s15425" name="think-cell Slide" r:id="rId6" imgW="270" imgH="270" progId="TCLayout.ActiveDocument.1">
                   <p:embed/>
                 </p:oleObj>
               </mc:Choice>
@@ -18338,7 +18338,7 @@
           <a:graphicData uri="http://schemas.openxmlformats.org/presentationml/2006/ole">
             <mc:AlternateContent xmlns:mc="http://schemas.openxmlformats.org/markup-compatibility/2006">
               <mc:Choice xmlns:v="urn:schemas-microsoft-com:vml" Requires="v">
-                <p:oleObj spid="_x0000_s1088" name="think-cell Slide" r:id="rId5" imgW="270" imgH="270" progId="TCLayout.ActiveDocument.1">
+                <p:oleObj spid="_x0000_s1089" name="think-cell Slide" r:id="rId5" imgW="270" imgH="270" progId="TCLayout.ActiveDocument.1">
                   <p:embed/>
                 </p:oleObj>
               </mc:Choice>
@@ -19712,7 +19712,7 @@
           <a:graphicData uri="http://schemas.openxmlformats.org/presentationml/2006/ole">
             <mc:AlternateContent xmlns:mc="http://schemas.openxmlformats.org/markup-compatibility/2006">
               <mc:Choice xmlns:v="urn:schemas-microsoft-com:vml" Requires="v">
-                <p:oleObj spid="_x0000_s17474" name="think-cell Slide" r:id="rId5" imgW="270" imgH="270" progId="TCLayout.ActiveDocument.1">
+                <p:oleObj spid="_x0000_s17475" name="think-cell Slide" r:id="rId5" imgW="270" imgH="270" progId="TCLayout.ActiveDocument.1">
                   <p:embed/>
                 </p:oleObj>
               </mc:Choice>
@@ -23476,7 +23476,7 @@
             </a:r>
             <a:r>
               <a:rPr lang="en-US" dirty="0"/>
-              <a:t> that contains all previous versions of the Memento. It can both store and retrieve memento’s.</a:t>
+              <a:t> that contains all previous versions of the Memento. It can both store and retrieve mementos.</a:t>
             </a:r>
             <a:br>
               <a:rPr lang="en-US" dirty="0"/>

</xml_diff>

<commit_message>
Added presentation video link.
</commit_message>
<xml_diff>
--- a/design_patterns_for_lunch_memento - 27-10-2020.pptx
+++ b/design_patterns_for_lunch_memento - 27-10-2020.pptx
@@ -946,7 +946,7 @@
           <a:graphicData uri="http://schemas.openxmlformats.org/presentationml/2006/ole">
             <mc:AlternateContent xmlns:mc="http://schemas.openxmlformats.org/markup-compatibility/2006">
               <mc:Choice xmlns:v="urn:schemas-microsoft-com:vml" Requires="v">
-                <p:oleObj spid="_x0000_s3137" name="think-cell Slide" r:id="rId4" imgW="270" imgH="270" progId="TCLayout.ActiveDocument.1">
+                <p:oleObj spid="_x0000_s3139" name="think-cell Slide" r:id="rId4" imgW="270" imgH="270" progId="TCLayout.ActiveDocument.1">
                   <p:embed/>
                 </p:oleObj>
               </mc:Choice>
@@ -12689,7 +12689,7 @@
           <a:graphicData uri="http://schemas.openxmlformats.org/presentationml/2006/ole">
             <mc:AlternateContent xmlns:mc="http://schemas.openxmlformats.org/markup-compatibility/2006">
               <mc:Choice xmlns:v="urn:schemas-microsoft-com:vml" Requires="v">
-                <p:oleObj spid="_x0000_s16448" name="think-cell Slide" r:id="rId4" imgW="270" imgH="270" progId="TCLayout.ActiveDocument.1">
+                <p:oleObj spid="_x0000_s16450" name="think-cell Slide" r:id="rId4" imgW="270" imgH="270" progId="TCLayout.ActiveDocument.1">
                   <p:embed/>
                 </p:oleObj>
               </mc:Choice>
@@ -13798,7 +13798,7 @@
           <a:graphicData uri="http://schemas.openxmlformats.org/presentationml/2006/ole">
             <mc:AlternateContent xmlns:mc="http://schemas.openxmlformats.org/markup-compatibility/2006">
               <mc:Choice xmlns:v="urn:schemas-microsoft-com:vml" Requires="v">
-                <p:oleObj spid="_x0000_s18496" name="think-cell Slide" r:id="rId4" imgW="270" imgH="270" progId="TCLayout.ActiveDocument.1">
+                <p:oleObj spid="_x0000_s18498" name="think-cell Slide" r:id="rId4" imgW="270" imgH="270" progId="TCLayout.ActiveDocument.1">
                   <p:embed/>
                 </p:oleObj>
               </mc:Choice>
@@ -14746,7 +14746,7 @@
           <a:graphicData uri="http://schemas.openxmlformats.org/presentationml/2006/ole">
             <mc:AlternateContent xmlns:mc="http://schemas.openxmlformats.org/markup-compatibility/2006">
               <mc:Choice xmlns:v="urn:schemas-microsoft-com:vml" Requires="v">
-                <p:oleObj spid="_x0000_s2113" name="think-cell Slide" r:id="rId5" imgW="270" imgH="270" progId="TCLayout.ActiveDocument.1">
+                <p:oleObj spid="_x0000_s2115" name="think-cell Slide" r:id="rId5" imgW="270" imgH="270" progId="TCLayout.ActiveDocument.1">
                   <p:embed/>
                 </p:oleObj>
               </mc:Choice>
@@ -15476,7 +15476,7 @@
           <a:graphicData uri="http://schemas.openxmlformats.org/presentationml/2006/ole">
             <mc:AlternateContent xmlns:mc="http://schemas.openxmlformats.org/markup-compatibility/2006">
               <mc:Choice xmlns:v="urn:schemas-microsoft-com:vml" Requires="v">
-                <p:oleObj spid="_x0000_s4161" name="think-cell Slide" r:id="rId6" imgW="270" imgH="270" progId="TCLayout.ActiveDocument.1">
+                <p:oleObj spid="_x0000_s4163" name="think-cell Slide" r:id="rId6" imgW="270" imgH="270" progId="TCLayout.ActiveDocument.1">
                   <p:embed/>
                 </p:oleObj>
               </mc:Choice>
@@ -15906,7 +15906,7 @@
           <a:graphicData uri="http://schemas.openxmlformats.org/presentationml/2006/ole">
             <mc:AlternateContent xmlns:mc="http://schemas.openxmlformats.org/markup-compatibility/2006">
               <mc:Choice xmlns:v="urn:schemas-microsoft-com:vml" Requires="v">
-                <p:oleObj spid="_x0000_s15425" name="think-cell Slide" r:id="rId6" imgW="270" imgH="270" progId="TCLayout.ActiveDocument.1">
+                <p:oleObj spid="_x0000_s15427" name="think-cell Slide" r:id="rId6" imgW="270" imgH="270" progId="TCLayout.ActiveDocument.1">
                   <p:embed/>
                 </p:oleObj>
               </mc:Choice>
@@ -18338,7 +18338,7 @@
           <a:graphicData uri="http://schemas.openxmlformats.org/presentationml/2006/ole">
             <mc:AlternateContent xmlns:mc="http://schemas.openxmlformats.org/markup-compatibility/2006">
               <mc:Choice xmlns:v="urn:schemas-microsoft-com:vml" Requires="v">
-                <p:oleObj spid="_x0000_s1089" name="think-cell Slide" r:id="rId5" imgW="270" imgH="270" progId="TCLayout.ActiveDocument.1">
+                <p:oleObj spid="_x0000_s1091" name="think-cell Slide" r:id="rId5" imgW="270" imgH="270" progId="TCLayout.ActiveDocument.1">
                   <p:embed/>
                 </p:oleObj>
               </mc:Choice>
@@ -19712,7 +19712,7 @@
           <a:graphicData uri="http://schemas.openxmlformats.org/presentationml/2006/ole">
             <mc:AlternateContent xmlns:mc="http://schemas.openxmlformats.org/markup-compatibility/2006">
               <mc:Choice xmlns:v="urn:schemas-microsoft-com:vml" Requires="v">
-                <p:oleObj spid="_x0000_s17475" name="think-cell Slide" r:id="rId5" imgW="270" imgH="270" progId="TCLayout.ActiveDocument.1">
+                <p:oleObj spid="_x0000_s17477" name="think-cell Slide" r:id="rId5" imgW="270" imgH="270" progId="TCLayout.ActiveDocument.1">
                   <p:embed/>
                 </p:oleObj>
               </mc:Choice>
@@ -24135,6 +24135,44 @@
           </a:prstGeom>
         </p:spPr>
       </p:pic>
+      <p:sp>
+        <p:nvSpPr>
+          <p:cNvPr id="2" name="TextBox 1">
+            <a:extLst>
+              <a:ext uri="{FF2B5EF4-FFF2-40B4-BE49-F238E27FC236}">
+                <a16:creationId xmlns:a16="http://schemas.microsoft.com/office/drawing/2014/main" id="{9D6DD686-7345-D34F-92EA-2CBBEE17AC89}"/>
+              </a:ext>
+            </a:extLst>
+          </p:cNvPr>
+          <p:cNvSpPr txBox="1"/>
+          <p:nvPr/>
+        </p:nvSpPr>
+        <p:spPr>
+          <a:xfrm>
+            <a:off x="2945674" y="1408105"/>
+            <a:ext cx="5688586" cy="369332"/>
+          </a:xfrm>
+          <a:prstGeom prst="rect">
+            <a:avLst/>
+          </a:prstGeom>
+          <a:noFill/>
+        </p:spPr>
+        <p:txBody>
+          <a:bodyPr wrap="square" rtlCol="0">
+            <a:spAutoFit/>
+          </a:bodyPr>
+          <a:lstStyle/>
+          <a:p>
+            <a:r>
+              <a:rPr lang="en-GB" dirty="0">
+                <a:hlinkClick r:id="rId5"/>
+              </a:rPr>
+              <a:t>Click here to watch a video of the presentation</a:t>
+            </a:r>
+            <a:endParaRPr lang="en-NL" dirty="0"/>
+          </a:p>
+        </p:txBody>
+      </p:sp>
     </p:spTree>
     <p:extLst>
       <p:ext uri="{BB962C8B-B14F-4D97-AF65-F5344CB8AC3E}">

</xml_diff>